<commit_message>
(FM-3578) Update xDscResources from PowerShell Repo
Import all the current xDscResources from the PowerShell Github Repo and
update all xDscResource types
</commit_message>
<xml_diff>
--- a/lib/puppet_x/dsc_resources/xJea/Docs/Jea.pptx
+++ b/lib/puppet_x/dsc_resources/xJea/Docs/Jea.pptx
@@ -232,7 +232,7 @@
           <a:p>
             <a:fld id="{946E1AD8-18BD-4A9D-926D-4003FFDE6DEC}" type="datetimeFigureOut">
               <a:rPr lang="en-US" smtClean="0"/>
-              <a:t>6/4/2014</a:t>
+              <a:t>5/4/2014</a:t>
             </a:fld>
             <a:endParaRPr lang="en-US"/>
           </a:p>
@@ -619,7 +619,7 @@
           <a:p>
             <a:fld id="{E74353ED-ACB2-44BF-A903-985B0AF962B7}" type="datetime1">
               <a:rPr lang="en-US" smtClean="0"/>
-              <a:t>6/4/2014</a:t>
+              <a:t>5/4/2014</a:t>
             </a:fld>
             <a:endParaRPr lang="en-US" dirty="0"/>
           </a:p>
@@ -944,22 +944,22 @@
   <p:extLst mod="1">
     <p:ext uri="{DCECCB84-F9BA-43D5-87BE-67443E8EF086}">
       <p15:sldGuideLst xmlns:p15="http://schemas.microsoft.com/office/powerpoint/2012/main">
-        <p15:guide id="1" pos="288">
+        <p15:guide id="4294967295" pos="288">
           <p15:clr>
             <a:srgbClr val="C35EA4"/>
           </p15:clr>
         </p15:guide>
-        <p15:guide id="2" pos="7546">
+        <p15:guide id="4294967295" pos="7546">
           <p15:clr>
             <a:srgbClr val="C35EA4"/>
           </p15:clr>
         </p15:guide>
-        <p15:guide id="3" orient="horz" pos="302">
+        <p15:guide id="4294967295" orient="horz" pos="302">
           <p15:clr>
             <a:srgbClr val="C35EA4"/>
           </p15:clr>
         </p15:guide>
-        <p15:guide id="4" orient="horz" pos="4104">
+        <p15:guide id="4294967295" orient="horz" pos="4104">
           <p15:clr>
             <a:srgbClr val="C35EA4"/>
           </p15:clr>
@@ -3216,13 +3216,13 @@
   <p:clrMapOvr>
     <a:masterClrMapping/>
   </p:clrMapOvr>
-  <mc:AlternateContent xmlns:mc="http://schemas.openxmlformats.org/markup-compatibility/2006" xmlns:p14="http://schemas.microsoft.com/office/powerpoint/2010/main">
-    <mc:Choice Requires="p14">
+  <mc:AlternateContent xmlns:mc="http://schemas.openxmlformats.org/markup-compatibility/2006">
+    <mc:Choice xmlns:p14="http://schemas.microsoft.com/office/powerpoint/2010/main" Requires="p14">
       <p:transition spd="slow" p14:dur="3400">
         <p14:reveal/>
       </p:transition>
     </mc:Choice>
-    <mc:Fallback xmlns="">
+    <mc:Fallback>
       <p:transition spd="slow">
         <p:fade/>
       </p:transition>
@@ -4469,13 +4469,13 @@
   <p:clrMapOvr>
     <a:masterClrMapping/>
   </p:clrMapOvr>
-  <mc:AlternateContent xmlns:mc="http://schemas.openxmlformats.org/markup-compatibility/2006" xmlns:p14="http://schemas.microsoft.com/office/powerpoint/2010/main">
-    <mc:Choice Requires="p14">
+  <mc:AlternateContent xmlns:mc="http://schemas.openxmlformats.org/markup-compatibility/2006">
+    <mc:Choice xmlns:p14="http://schemas.microsoft.com/office/powerpoint/2010/main" Requires="p14">
       <p:transition spd="slow" p14:dur="3400">
         <p14:reveal/>
       </p:transition>
     </mc:Choice>
-    <mc:Fallback xmlns="">
+    <mc:Fallback>
       <p:transition spd="slow">
         <p:fade/>
       </p:transition>
@@ -4491,7 +4491,7 @@
   <p:extLst mod="1">
     <p:ext uri="{DCECCB84-F9BA-43D5-87BE-67443E8EF086}">
       <p15:sldGuideLst xmlns:p15="http://schemas.microsoft.com/office/powerpoint/2012/main">
-        <p15:guide id="1" orient="horz" pos="4406">
+        <p15:guide id="4294967295" orient="horz" pos="4406">
           <p15:clr>
             <a:srgbClr val="C35EA4"/>
           </p15:clr>
@@ -5821,7 +5821,7 @@
           <a:p>
             <a:fld id="{D5B095DE-B117-4724-BACE-A69DC66D094B}" type="datetimeFigureOut">
               <a:rPr lang="en-US" smtClean="0"/>
-              <a:t>6/4/2014</a:t>
+              <a:t>5/4/2014</a:t>
             </a:fld>
             <a:endParaRPr lang="en-US"/>
           </a:p>
@@ -6158,13 +6158,13 @@
   <p:clrMapOvr>
     <a:masterClrMapping/>
   </p:clrMapOvr>
-  <mc:AlternateContent xmlns:mc="http://schemas.openxmlformats.org/markup-compatibility/2006" xmlns:p14="http://schemas.microsoft.com/office/powerpoint/2010/main">
-    <mc:Choice Requires="p14">
+  <mc:AlternateContent xmlns:mc="http://schemas.openxmlformats.org/markup-compatibility/2006">
+    <mc:Choice xmlns:p14="http://schemas.microsoft.com/office/powerpoint/2010/main" Requires="p14">
       <p:transition spd="slow" p14:dur="3400">
         <p14:reveal/>
       </p:transition>
     </mc:Choice>
-    <mc:Fallback xmlns="">
+    <mc:Fallback>
       <p:transition spd="slow">
         <p:fade/>
       </p:transition>
@@ -6416,13 +6416,13 @@
   <p:clrMapOvr>
     <a:masterClrMapping/>
   </p:clrMapOvr>
-  <mc:AlternateContent xmlns:mc="http://schemas.openxmlformats.org/markup-compatibility/2006" xmlns:p14="http://schemas.microsoft.com/office/powerpoint/2010/main">
-    <mc:Choice Requires="p14">
+  <mc:AlternateContent xmlns:mc="http://schemas.openxmlformats.org/markup-compatibility/2006">
+    <mc:Choice xmlns:p14="http://schemas.microsoft.com/office/powerpoint/2010/main" Requires="p14">
       <p:transition spd="slow" p14:dur="3400">
         <p14:reveal/>
       </p:transition>
     </mc:Choice>
-    <mc:Fallback xmlns="">
+    <mc:Fallback>
       <p:transition spd="slow">
         <p:fade/>
       </p:transition>
@@ -6622,13 +6622,13 @@
   <p:clrMapOvr>
     <a:masterClrMapping/>
   </p:clrMapOvr>
-  <mc:AlternateContent xmlns:mc="http://schemas.openxmlformats.org/markup-compatibility/2006" xmlns:p14="http://schemas.microsoft.com/office/powerpoint/2010/main">
-    <mc:Choice Requires="p14">
+  <mc:AlternateContent xmlns:mc="http://schemas.openxmlformats.org/markup-compatibility/2006">
+    <mc:Choice xmlns:p14="http://schemas.microsoft.com/office/powerpoint/2010/main" Requires="p14">
       <p:transition spd="slow" p14:dur="3400">
         <p14:reveal/>
       </p:transition>
     </mc:Choice>
-    <mc:Fallback xmlns="">
+    <mc:Fallback>
       <p:transition spd="slow">
         <p:fade/>
       </p:transition>
@@ -7605,132 +7605,132 @@
   <p:extLst mod="1">
     <p:ext uri="{27BBF7A9-308A-43DC-89C8-2F10F3537804}">
       <p15:sldGuideLst xmlns:p15="http://schemas.microsoft.com/office/powerpoint/2012/main">
-        <p15:guide id="1" orient="horz" pos="187">
+        <p15:guide id="4294967295" orient="horz" pos="187">
           <p15:clr>
             <a:srgbClr val="5ACBF0"/>
           </p15:clr>
         </p15:guide>
-        <p15:guide id="2" pos="173">
+        <p15:guide id="4294967295" pos="173">
           <p15:clr>
             <a:srgbClr val="5ACBF0"/>
           </p15:clr>
         </p15:guide>
-        <p15:guide id="3" pos="7661">
+        <p15:guide id="4294967295" pos="7661">
           <p15:clr>
             <a:srgbClr val="5ACBF0"/>
           </p15:clr>
         </p15:guide>
-        <p15:guide id="4" orient="horz" pos="4219">
+        <p15:guide id="4294967295" orient="horz" pos="4219">
           <p15:clr>
             <a:srgbClr val="5ACBF0"/>
           </p15:clr>
         </p15:guide>
-        <p15:guide id="5" pos="749">
+        <p15:guide id="4294967295" pos="749">
           <p15:clr>
             <a:srgbClr val="5ACBF0"/>
           </p15:clr>
         </p15:guide>
-        <p15:guide id="6" pos="1325">
+        <p15:guide id="4294967295" pos="1325">
           <p15:clr>
             <a:srgbClr val="5ACBF0"/>
           </p15:clr>
         </p15:guide>
-        <p15:guide id="7" pos="1901">
+        <p15:guide id="4294967295" pos="1901">
           <p15:clr>
             <a:srgbClr val="5ACBF0"/>
           </p15:clr>
         </p15:guide>
-        <p15:guide id="8" pos="2477">
+        <p15:guide id="4294967295" pos="2477">
           <p15:clr>
             <a:srgbClr val="5ACBF0"/>
           </p15:clr>
         </p15:guide>
-        <p15:guide id="9" pos="3053">
+        <p15:guide id="4294967295" pos="3053">
           <p15:clr>
             <a:srgbClr val="5ACBF0"/>
           </p15:clr>
         </p15:guide>
-        <p15:guide id="10" pos="3629">
+        <p15:guide id="4294967295" pos="3629">
           <p15:clr>
             <a:srgbClr val="5ACBF0"/>
           </p15:clr>
         </p15:guide>
-        <p15:guide id="11" pos="4205">
+        <p15:guide id="4294967295" pos="4205">
           <p15:clr>
             <a:srgbClr val="5ACBF0"/>
           </p15:clr>
         </p15:guide>
-        <p15:guide id="12" pos="4781">
+        <p15:guide id="4294967295" pos="4781">
           <p15:clr>
             <a:srgbClr val="5ACBF0"/>
           </p15:clr>
         </p15:guide>
-        <p15:guide id="13" pos="5357">
+        <p15:guide id="4294967295" pos="5357">
           <p15:clr>
             <a:srgbClr val="5ACBF0"/>
           </p15:clr>
         </p15:guide>
-        <p15:guide id="14" pos="5933">
+        <p15:guide id="4294967295" pos="5933">
           <p15:clr>
             <a:srgbClr val="5ACBF0"/>
           </p15:clr>
         </p15:guide>
-        <p15:guide id="15" pos="6509">
+        <p15:guide id="4294967295" pos="6509">
           <p15:clr>
             <a:srgbClr val="5ACBF0"/>
           </p15:clr>
         </p15:guide>
-        <p15:guide id="16" pos="7085">
+        <p15:guide id="4294967295" pos="7085">
           <p15:clr>
             <a:srgbClr val="5ACBF0"/>
           </p15:clr>
         </p15:guide>
-        <p15:guide id="17" orient="horz" pos="763">
+        <p15:guide id="4294967295" orient="horz" pos="763">
           <p15:clr>
             <a:srgbClr val="5ACBF0"/>
           </p15:clr>
         </p15:guide>
-        <p15:guide id="18" orient="horz" pos="1339">
+        <p15:guide id="4294967295" orient="horz" pos="1339">
           <p15:clr>
             <a:srgbClr val="5ACBF0"/>
           </p15:clr>
         </p15:guide>
-        <p15:guide id="19" orient="horz" pos="1915">
+        <p15:guide id="4294967295" orient="horz" pos="1915">
           <p15:clr>
             <a:srgbClr val="5ACBF0"/>
           </p15:clr>
         </p15:guide>
-        <p15:guide id="20" orient="horz" pos="2491">
+        <p15:guide id="4294967295" orient="horz" pos="2491">
           <p15:clr>
             <a:srgbClr val="5ACBF0"/>
           </p15:clr>
         </p15:guide>
-        <p15:guide id="21" orient="horz" pos="3067">
+        <p15:guide id="4294967295" orient="horz" pos="3067">
           <p15:clr>
             <a:srgbClr val="5ACBF0"/>
           </p15:clr>
         </p15:guide>
-        <p15:guide id="22" orient="horz" pos="3643">
+        <p15:guide id="4294967295" orient="horz" pos="3643">
           <p15:clr>
             <a:srgbClr val="5ACBF0"/>
           </p15:clr>
         </p15:guide>
-        <p15:guide id="23" pos="288">
+        <p15:guide id="4294967295" pos="288">
           <p15:clr>
             <a:srgbClr val="C35EA4"/>
           </p15:clr>
         </p15:guide>
-        <p15:guide id="24" pos="7546">
+        <p15:guide id="4294967295" pos="7546">
           <p15:clr>
             <a:srgbClr val="C35EA4"/>
           </p15:clr>
         </p15:guide>
-        <p15:guide id="25" orient="horz" pos="302">
+        <p15:guide id="4294967295" orient="horz" pos="302">
           <p15:clr>
             <a:srgbClr val="C35EA4"/>
           </p15:clr>
         </p15:guide>
-        <p15:guide id="26" orient="horz" pos="4104">
+        <p15:guide id="4294967295" orient="horz" pos="4104">
           <p15:clr>
             <a:srgbClr val="C35EA4"/>
           </p15:clr>
@@ -7927,6 +7927,7 @@
               <a:rPr lang="en-US" sz="3200" dirty="0" smtClean="0"/>
               <a:t>All admin actions got logged</a:t>
             </a:r>
+            <a:endParaRPr lang="en-US" sz="3200" dirty="0" smtClean="0"/>
           </a:p>
         </p:txBody>
       </p:sp>
@@ -8462,7 +8463,11 @@
           <a:p>
             <a:r>
               <a:rPr lang="en-US" dirty="0" smtClean="0"/>
-              <a:t>Just use </a:t>
+              <a:t>Just u</a:t>
+            </a:r>
+            <a:r>
+              <a:rPr lang="en-US" dirty="0" smtClean="0"/>
+              <a:t>se </a:t>
             </a:r>
             <a:r>
               <a:rPr lang="en-US" dirty="0" err="1" smtClean="0"/>
@@ -8743,7 +8748,18 @@
                 <a:cs typeface="Consolas" panose="020B0609020204030204" pitchFamily="49" charset="0"/>
                 <a:sym typeface="Wingdings" panose="05000000000000000000" pitchFamily="2" charset="2"/>
               </a:rPr>
-              <a:t>Error: You are not authorized to Steal-Secrets</a:t>
+              <a:t>Error: You </a:t>
+            </a:r>
+            <a:r>
+              <a:rPr lang="en-US" dirty="0" smtClean="0">
+                <a:solidFill>
+                  <a:srgbClr val="FF0000"/>
+                </a:solidFill>
+                <a:latin typeface="Consolas" panose="020B0609020204030204" pitchFamily="49" charset="0"/>
+                <a:cs typeface="Consolas" panose="020B0609020204030204" pitchFamily="49" charset="0"/>
+                <a:sym typeface="Wingdings" panose="05000000000000000000" pitchFamily="2" charset="2"/>
+              </a:rPr>
+              <a:t>are not authorized to Steal-Secrets</a:t>
             </a:r>
             <a:endParaRPr lang="en-US" dirty="0">
               <a:solidFill>
@@ -12320,13 +12336,13 @@
   <p:clrMapOvr>
     <a:masterClrMapping/>
   </p:clrMapOvr>
-  <mc:AlternateContent xmlns:mc="http://schemas.openxmlformats.org/markup-compatibility/2006" xmlns:p14="http://schemas.microsoft.com/office/powerpoint/2010/main">
-    <mc:Choice Requires="p14">
+  <mc:AlternateContent xmlns:mc="http://schemas.openxmlformats.org/markup-compatibility/2006">
+    <mc:Choice xmlns:p14="http://schemas.microsoft.com/office/powerpoint/2010/main" Requires="p14">
       <p:transition spd="slow" p14:dur="3400">
         <p14:reveal/>
       </p:transition>
     </mc:Choice>
-    <mc:Fallback xmlns="">
+    <mc:Fallback>
       <p:transition spd="slow">
         <p:fade/>
       </p:transition>
@@ -12410,6 +12426,7 @@
               <a:rPr lang="en-US" dirty="0" smtClean="0"/>
               <a:t>ole-based administration to secure a </a:t>
             </a:r>
+            <a:endParaRPr lang="en-US" dirty="0" smtClean="0"/>
           </a:p>
           <a:p>
             <a:r>
@@ -12428,6 +12445,7 @@
               <a:rPr lang="en-US" dirty="0" smtClean="0"/>
               <a:t>Jeffrey Snover</a:t>
             </a:r>
+            <a:endParaRPr lang="en-US" dirty="0" smtClean="0"/>
           </a:p>
         </p:txBody>
       </p:sp>
@@ -12441,13 +12459,13 @@
   <p:clrMapOvr>
     <a:masterClrMapping/>
   </p:clrMapOvr>
-  <mc:AlternateContent xmlns:mc="http://schemas.openxmlformats.org/markup-compatibility/2006" xmlns:p14="http://schemas.microsoft.com/office/powerpoint/2010/main">
-    <mc:Choice Requires="p14">
+  <mc:AlternateContent xmlns:mc="http://schemas.openxmlformats.org/markup-compatibility/2006">
+    <mc:Choice xmlns:p14="http://schemas.microsoft.com/office/powerpoint/2010/main" Requires="p14">
       <p:transition spd="slow" p14:dur="3400">
         <p14:reveal/>
       </p:transition>
     </mc:Choice>
-    <mc:Fallback xmlns="">
+    <mc:Fallback>
       <p:transition spd="slow">
         <p:fade/>
       </p:transition>
@@ -16149,6 +16167,7 @@
               <a:rPr lang="en-US" sz="3200" dirty="0" smtClean="0"/>
               <a:t>if you need full backwards compatibility</a:t>
             </a:r>
+            <a:endParaRPr lang="en-US" sz="3200" dirty="0" smtClean="0"/>
           </a:p>
           <a:p>
             <a:pPr lvl="1"/>
@@ -17220,7 +17239,17 @@
                 <a:latin typeface="Lucida Console" panose="020B0609040504020204" pitchFamily="49" charset="0"/>
                 <a:cs typeface="+mn-cs"/>
               </a:rPr>
-              <a:t>   % {$_.</a:t>
+              <a:t> </a:t>
+            </a:r>
+            <a:r>
+              <a:rPr lang="en-US" sz="2400" dirty="0">
+                <a:solidFill>
+                  <a:srgbClr val="0000FF"/>
+                </a:solidFill>
+                <a:latin typeface="Lucida Console" panose="020B0609040504020204" pitchFamily="49" charset="0"/>
+                <a:cs typeface="+mn-cs"/>
+              </a:rPr>
+              <a:t>  % {$_.</a:t>
             </a:r>
             <a:r>
               <a:rPr lang="en-US" sz="2400" dirty="0" err="1">
@@ -18324,6 +18353,15 @@
               </a:rPr>
               <a:t>    </a:t>
             </a:r>
+            <a:r>
+              <a:rPr lang="en-US" sz="2000" dirty="0">
+                <a:solidFill>
+                  <a:srgbClr val="0000FF"/>
+                </a:solidFill>
+                <a:latin typeface="Lucida Console" panose="020B0609040504020204" pitchFamily="49" charset="0"/>
+              </a:rPr>
+              <a:t/>
+            </a:r>
             <a:br>
               <a:rPr lang="en-US" sz="2000" dirty="0">
                 <a:solidFill>
@@ -18686,6 +18724,12 @@
               </a:rPr>
               <a:t> </a:t>
             </a:r>
+            <a:endParaRPr lang="en-US" sz="2000" dirty="0">
+              <a:solidFill>
+                <a:srgbClr val="0000FF"/>
+              </a:solidFill>
+              <a:latin typeface="Lucida Console" panose="020B0609040504020204" pitchFamily="49" charset="0"/>
+            </a:endParaRPr>
           </a:p>
           <a:p>
             <a:endParaRPr lang="en-US" dirty="0"/>
@@ -19163,7 +19207,11 @@
             </a:r>
             <a:r>
               <a:rPr lang="en-US" sz="2800" dirty="0" smtClean="0"/>
-              <a:t>    these attacks?</a:t>
+              <a:t>    </a:t>
+            </a:r>
+            <a:r>
+              <a:rPr lang="en-US" sz="2800" dirty="0" smtClean="0"/>
+              <a:t>these attacks?</a:t>
             </a:r>
           </a:p>
           <a:p>
@@ -19172,7 +19220,15 @@
           <a:p>
             <a:r>
               <a:rPr lang="en-US" sz="2800" dirty="0" smtClean="0"/>
-              <a:t>A: “Man up and defend yourselves!”</a:t>
+              <a:t>A: </a:t>
+            </a:r>
+            <a:r>
+              <a:rPr lang="en-US" sz="2800" dirty="0" smtClean="0"/>
+              <a:t>“Man </a:t>
+            </a:r>
+            <a:r>
+              <a:rPr lang="en-US" sz="2800" dirty="0" smtClean="0"/>
+              <a:t>up and defend yourselves!”</a:t>
             </a:r>
             <a:endParaRPr lang="en-US" sz="2800" dirty="0"/>
           </a:p>

</xml_diff>